<commit_message>
Updated text for presentation
</commit_message>
<xml_diff>
--- a/Presentations/Mimir and tyle Demo.pptx
+++ b/Presentations/Mimir and tyle Demo.pptx
@@ -109,34 +109,47 @@
       </a:defRPr>
     </a:lvl9pPr>
   </p:defaultTextStyle>
+  <p:extLst>
+    <p:ext uri="{EFAFB233-063F-42B5-8137-9DF3F51BA10A}">
+      <p15:sldGuideLst xmlns:p15="http://schemas.microsoft.com/office/powerpoint/2012/main"/>
+    </p:ext>
+  </p:extLst>
 </p:presentation>
+</file>
+
+<file path=ppt/revisionInfo.xml><?xml version="1.0" encoding="utf-8"?>
+<p1510:revInfo xmlns:a="http://schemas.openxmlformats.org/drawingml/2006/main" xmlns:r="http://schemas.openxmlformats.org/officeDocument/2006/relationships" xmlns:p1510="http://schemas.microsoft.com/office/powerpoint/2015/10/main">
+  <p1510:revLst>
+    <p1510:client id="{6AE5780A-4DB9-4F6D-B079-5E5303F8FF90}" v="4" dt="2022-09-08T11:04:14.463"/>
+  </p1510:revLst>
+</p1510:revInfo>
 </file>
 
 <file path=ppt/changesInfos/changesInfo1.xml><?xml version="1.0" encoding="utf-8"?>
 <pc:chgInfo xmlns:a="http://schemas.openxmlformats.org/drawingml/2006/main" xmlns:r="http://schemas.openxmlformats.org/officeDocument/2006/relationships" xmlns:ac="http://schemas.microsoft.com/office/drawing/2013/main/command" xmlns:pc="http://schemas.microsoft.com/office/powerpoint/2013/main/command">
   <pc:docChgLst>
     <pc:chgData name="Reidar Liabø" userId="0b8a0760-987c-4352-9b6d-583350ae227e" providerId="ADAL" clId="{6AE5780A-4DB9-4F6D-B079-5E5303F8FF90}"/>
-    <pc:docChg chg="modSld">
-      <pc:chgData name="Reidar Liabø" userId="0b8a0760-987c-4352-9b6d-583350ae227e" providerId="ADAL" clId="{6AE5780A-4DB9-4F6D-B079-5E5303F8FF90}" dt="2022-09-07T18:30:22.199" v="189" actId="255"/>
+    <pc:docChg chg="custSel modSld">
+      <pc:chgData name="Reidar Liabø" userId="0b8a0760-987c-4352-9b6d-583350ae227e" providerId="ADAL" clId="{6AE5780A-4DB9-4F6D-B079-5E5303F8FF90}" dt="2022-09-08T11:06:14.651" v="358" actId="20577"/>
       <pc:docMkLst>
         <pc:docMk/>
       </pc:docMkLst>
       <pc:sldChg chg="modNotesTx">
-        <pc:chgData name="Reidar Liabø" userId="0b8a0760-987c-4352-9b6d-583350ae227e" providerId="ADAL" clId="{6AE5780A-4DB9-4F6D-B079-5E5303F8FF90}" dt="2022-09-07T18:30:22.199" v="189" actId="255"/>
+        <pc:chgData name="Reidar Liabø" userId="0b8a0760-987c-4352-9b6d-583350ae227e" providerId="ADAL" clId="{6AE5780A-4DB9-4F6D-B079-5E5303F8FF90}" dt="2022-09-08T11:01:11.309" v="326" actId="20577"/>
         <pc:sldMkLst>
           <pc:docMk/>
           <pc:sldMk cId="1566684926" sldId="256"/>
         </pc:sldMkLst>
       </pc:sldChg>
       <pc:sldChg chg="modNotesTx">
-        <pc:chgData name="Reidar Liabø" userId="0b8a0760-987c-4352-9b6d-583350ae227e" providerId="ADAL" clId="{6AE5780A-4DB9-4F6D-B079-5E5303F8FF90}" dt="2022-09-07T18:30:01.722" v="187" actId="20577"/>
+        <pc:chgData name="Reidar Liabø" userId="0b8a0760-987c-4352-9b6d-583350ae227e" providerId="ADAL" clId="{6AE5780A-4DB9-4F6D-B079-5E5303F8FF90}" dt="2022-09-08T11:06:14.651" v="358" actId="20577"/>
         <pc:sldMkLst>
           <pc:docMk/>
           <pc:sldMk cId="1532151880" sldId="257"/>
         </pc:sldMkLst>
       </pc:sldChg>
       <pc:sldChg chg="modNotesTx">
-        <pc:chgData name="Reidar Liabø" userId="0b8a0760-987c-4352-9b6d-583350ae227e" providerId="ADAL" clId="{6AE5780A-4DB9-4F6D-B079-5E5303F8FF90}" dt="2022-09-07T18:27:17.539" v="56" actId="20577"/>
+        <pc:chgData name="Reidar Liabø" userId="0b8a0760-987c-4352-9b6d-583350ae227e" providerId="ADAL" clId="{6AE5780A-4DB9-4F6D-B079-5E5303F8FF90}" dt="2022-09-08T11:05:18.981" v="354" actId="20577"/>
         <pc:sldMkLst>
           <pc:docMk/>
           <pc:sldMk cId="2951482252" sldId="258"/>
@@ -229,7 +242,7 @@
           <a:p>
             <a:fld id="{5E5284AD-A6E5-4D3F-B817-95E7F18AEDCF}" type="datetimeFigureOut">
               <a:rPr lang="nb-NO" smtClean="0"/>
-              <a:t>07.09.2022</a:t>
+              <a:t>08.09.2022</a:t>
             </a:fld>
             <a:endParaRPr lang="nb-NO"/>
           </a:p>
@@ -541,7 +554,7 @@
           <a:bodyPr/>
           <a:lstStyle/>
           <a:p>
-            <a:pPr marL="285750" indent="-285750">
+            <a:pPr marL="0" indent="0">
               <a:lnSpc>
                 <a:spcPct val="107000"/>
               </a:lnSpc>
@@ -549,7 +562,7 @@
                 <a:spcPts val="800"/>
               </a:spcAft>
               <a:buFont typeface="Arial" panose="020B0604020202020204" pitchFamily="34" charset="0"/>
-              <a:buChar char="•"/>
+              <a:buNone/>
             </a:pPr>
             <a:r>
               <a:rPr lang="en-US" sz="4400" dirty="0">
@@ -577,7 +590,7 @@
             </a:endParaRPr>
           </a:p>
           <a:p>
-            <a:pPr marL="285750" indent="-285750">
+            <a:pPr marL="0" indent="0">
               <a:lnSpc>
                 <a:spcPct val="107000"/>
               </a:lnSpc>
@@ -585,7 +598,7 @@
                 <a:spcPts val="800"/>
               </a:spcAft>
               <a:buFont typeface="Arial" panose="020B0604020202020204" pitchFamily="34" charset="0"/>
-              <a:buChar char="•"/>
+              <a:buNone/>
             </a:pPr>
             <a:r>
               <a:rPr lang="en-US" sz="2800" dirty="0">
@@ -594,11 +607,11 @@
                 <a:ea typeface="Calibri" panose="020F0502020204030204" pitchFamily="34" charset="0"/>
                 <a:cs typeface="Times New Roman" panose="02020603050405020304" pitchFamily="18" charset="0"/>
               </a:rPr>
-              <a:t>Mimir and Tyle is already opensource applications. We have already settled down a minimum temporary community, that will take this project further. </a:t>
-            </a:r>
-          </a:p>
-          <a:p>
-            <a:pPr marL="285750" indent="-285750">
+              <a:t>We have already settled down a minimum temporary community, that will take this project further. </a:t>
+            </a:r>
+          </a:p>
+          <a:p>
+            <a:pPr marL="0" indent="0">
               <a:lnSpc>
                 <a:spcPct val="107000"/>
               </a:lnSpc>
@@ -606,7 +619,7 @@
                 <a:spcPts val="800"/>
               </a:spcAft>
               <a:buFont typeface="Arial" panose="020B0604020202020204" pitchFamily="34" charset="0"/>
-              <a:buChar char="•"/>
+              <a:buNone/>
             </a:pPr>
             <a:r>
               <a:rPr lang="en-US" sz="2800" dirty="0">
@@ -633,9 +646,9 @@
             </a:endParaRPr>
           </a:p>
           <a:p>
-            <a:pPr marL="285750" indent="-285750">
+            <a:pPr marL="0" indent="0">
               <a:buFont typeface="Arial" panose="020B0604020202020204" pitchFamily="34" charset="0"/>
-              <a:buChar char="•"/>
+              <a:buNone/>
             </a:pPr>
             <a:r>
               <a:rPr lang="en-US" sz="2800" dirty="0">
@@ -648,9 +661,9 @@
             </a:r>
           </a:p>
           <a:p>
-            <a:pPr marL="285750" indent="-285750">
+            <a:pPr marL="0" indent="0">
               <a:buFont typeface="Arial" panose="020B0604020202020204" pitchFamily="34" charset="0"/>
-              <a:buChar char="•"/>
+              <a:buNone/>
             </a:pPr>
             <a:r>
               <a:rPr lang="en-US" sz="2800" dirty="0">
@@ -659,13 +672,13 @@
                 <a:ea typeface="Calibri" panose="020F0502020204030204" pitchFamily="34" charset="0"/>
                 <a:cs typeface="Times New Roman" panose="02020603050405020304" pitchFamily="18" charset="0"/>
               </a:rPr>
-              <a:t>This is also the place to report bugs and wanted features. And of course, we are in an early stage of the project. </a:t>
-            </a:r>
-          </a:p>
-          <a:p>
-            <a:pPr marL="285750" indent="-285750">
+              <a:t>Shared code is distributed through NPM and NuGet.</a:t>
+            </a:r>
+          </a:p>
+          <a:p>
+            <a:pPr marL="0" indent="0">
               <a:buFont typeface="Arial" panose="020B0604020202020204" pitchFamily="34" charset="0"/>
-              <a:buChar char="•"/>
+              <a:buNone/>
             </a:pPr>
             <a:r>
               <a:rPr lang="en-US" sz="2800" dirty="0">
@@ -674,38 +687,17 @@
                 <a:ea typeface="Calibri" panose="020F0502020204030204" pitchFamily="34" charset="0"/>
                 <a:cs typeface="Times New Roman" panose="02020603050405020304" pitchFamily="18" charset="0"/>
               </a:rPr>
-              <a:t>Trust me, there will be some bugs and missing features.</a:t>
-            </a:r>
-          </a:p>
-          <a:p>
-            <a:pPr marL="285750" indent="-285750">
-              <a:buFont typeface="Arial" panose="020B0604020202020204" pitchFamily="34" charset="0"/>
-              <a:buChar char="•"/>
-            </a:pPr>
-            <a:endParaRPr lang="en-US" sz="2800" dirty="0">
-              <a:effectLst/>
-              <a:latin typeface="Calibri" panose="020F0502020204030204" pitchFamily="34" charset="0"/>
-              <a:cs typeface="Times New Roman" panose="02020603050405020304" pitchFamily="18" charset="0"/>
-            </a:endParaRPr>
-          </a:p>
-          <a:p>
-            <a:pPr marL="285750" marR="0" lvl="0" indent="-285750" algn="l" defTabSz="914400" rtl="0" eaLnBrk="1" fontAlgn="auto" latinLnBrk="0" hangingPunct="1">
-              <a:lnSpc>
-                <a:spcPct val="100000"/>
-              </a:lnSpc>
-              <a:spcBef>
-                <a:spcPts val="0"/>
-              </a:spcBef>
-              <a:spcAft>
-                <a:spcPts val="0"/>
-              </a:spcAft>
-              <a:buClrTx/>
-              <a:buSzTx/>
-              <a:buFont typeface="Arial" panose="020B0604020202020204" pitchFamily="34" charset="0"/>
-              <a:buChar char="•"/>
-              <a:tabLst/>
-              <a:defRPr/>
-            </a:pPr>
+              <a:t>All applications is shared through </a:t>
+            </a:r>
+            <a:r>
+              <a:rPr lang="en-US" sz="2800" dirty="0" err="1">
+                <a:effectLst/>
+                <a:latin typeface="Calibri" panose="020F0502020204030204" pitchFamily="34" charset="0"/>
+                <a:ea typeface="Calibri" panose="020F0502020204030204" pitchFamily="34" charset="0"/>
+                <a:cs typeface="Times New Roman" panose="02020603050405020304" pitchFamily="18" charset="0"/>
+              </a:rPr>
+              <a:t>Dockerhub</a:t>
+            </a:r>
             <a:r>
               <a:rPr lang="en-US" sz="2800" dirty="0">
                 <a:effectLst/>
@@ -713,9 +705,8 @@
                 <a:ea typeface="Calibri" panose="020F0502020204030204" pitchFamily="34" charset="0"/>
                 <a:cs typeface="Times New Roman" panose="02020603050405020304" pitchFamily="18" charset="0"/>
               </a:rPr>
-              <a:t>We have set up a system for distributing shared code with automatic build and deployment and all finally build docker images.</a:t>
-            </a:r>
-            <a:endParaRPr lang="nb-NO" sz="2800" dirty="0"/>
+              <a:t>.</a:t>
+            </a:r>
           </a:p>
         </p:txBody>
       </p:sp>
@@ -814,7 +805,63 @@
                 <a:ea typeface="Calibri" panose="020F0502020204030204" pitchFamily="34" charset="0"/>
                 <a:cs typeface="Times New Roman" panose="02020603050405020304" pitchFamily="18" charset="0"/>
               </a:rPr>
-              <a:t>It is important to understand that Tyle is not another ontology solution, but rather an application that can consume ontologies and create drawing tools for other applications and specially Mimir. </a:t>
+              <a:t>Tyle and Mimir has a React client and a </a:t>
+            </a:r>
+            <a:r>
+              <a:rPr lang="en-US" sz="1800" dirty="0" err="1">
+                <a:effectLst/>
+                <a:latin typeface="Calibri" panose="020F0502020204030204" pitchFamily="34" charset="0"/>
+                <a:ea typeface="Calibri" panose="020F0502020204030204" pitchFamily="34" charset="0"/>
+                <a:cs typeface="Times New Roman" panose="02020603050405020304" pitchFamily="18" charset="0"/>
+              </a:rPr>
+              <a:t>.Net</a:t>
+            </a:r>
+            <a:r>
+              <a:rPr lang="en-US" sz="1800" dirty="0">
+                <a:effectLst/>
+                <a:latin typeface="Calibri" panose="020F0502020204030204" pitchFamily="34" charset="0"/>
+                <a:ea typeface="Calibri" panose="020F0502020204030204" pitchFamily="34" charset="0"/>
+                <a:cs typeface="Times New Roman" panose="02020603050405020304" pitchFamily="18" charset="0"/>
+              </a:rPr>
+              <a:t> backend application. </a:t>
+            </a:r>
+          </a:p>
+          <a:p>
+            <a:pPr>
+              <a:lnSpc>
+                <a:spcPct val="107000"/>
+              </a:lnSpc>
+              <a:spcAft>
+                <a:spcPts val="800"/>
+              </a:spcAft>
+            </a:pPr>
+            <a:r>
+              <a:rPr lang="en-US" sz="1800" dirty="0">
+                <a:effectLst/>
+                <a:latin typeface="Calibri" panose="020F0502020204030204" pitchFamily="34" charset="0"/>
+                <a:ea typeface="Calibri" panose="020F0502020204030204" pitchFamily="34" charset="0"/>
+                <a:cs typeface="Times New Roman" panose="02020603050405020304" pitchFamily="18" charset="0"/>
+              </a:rPr>
+              <a:t>You can find more information about the technology stack at the GitHub repository. </a:t>
+            </a:r>
+          </a:p>
+          <a:p>
+            <a:pPr>
+              <a:lnSpc>
+                <a:spcPct val="107000"/>
+              </a:lnSpc>
+              <a:spcAft>
+                <a:spcPts val="800"/>
+              </a:spcAft>
+            </a:pPr>
+            <a:r>
+              <a:rPr lang="en-US" sz="1800" dirty="0">
+                <a:effectLst/>
+                <a:latin typeface="Calibri" panose="020F0502020204030204" pitchFamily="34" charset="0"/>
+                <a:ea typeface="Calibri" panose="020F0502020204030204" pitchFamily="34" charset="0"/>
+                <a:cs typeface="Times New Roman" panose="02020603050405020304" pitchFamily="18" charset="0"/>
+              </a:rPr>
+              <a:t>Each application has a SQL backup store.</a:t>
             </a:r>
             <a:endParaRPr lang="nb-NO" sz="1800" dirty="0">
               <a:effectLst/>
@@ -855,7 +902,7 @@
                 <a:ea typeface="Calibri" panose="020F0502020204030204" pitchFamily="34" charset="0"/>
                 <a:cs typeface="Times New Roman" panose="02020603050405020304" pitchFamily="18" charset="0"/>
               </a:rPr>
-              <a:t>Today we are consuming data from PCA. We have implemented a SPARQL web-client, that fetch data from PCA. In this first stage we are linking attribute definitions, unit of measurement, Quantities, Range or Quantity datums and Range datums.</a:t>
+              <a:t>It is important to understand that Tyle is not another ontology solution, but rather an application that can consume ontologies and create drawing tools for other applications and specially Mimir. </a:t>
             </a:r>
             <a:endParaRPr lang="nb-NO" sz="1800" dirty="0">
               <a:effectLst/>
@@ -863,6 +910,25 @@
               <a:ea typeface="Calibri" panose="020F0502020204030204" pitchFamily="34" charset="0"/>
               <a:cs typeface="Times New Roman" panose="02020603050405020304" pitchFamily="18" charset="0"/>
             </a:endParaRPr>
+          </a:p>
+          <a:p>
+            <a:pPr>
+              <a:lnSpc>
+                <a:spcPct val="107000"/>
+              </a:lnSpc>
+              <a:spcAft>
+                <a:spcPts val="800"/>
+              </a:spcAft>
+            </a:pPr>
+            <a:r>
+              <a:rPr lang="en-US" sz="1800" dirty="0">
+                <a:effectLst/>
+                <a:latin typeface="Calibri" panose="020F0502020204030204" pitchFamily="34" charset="0"/>
+                <a:ea typeface="Calibri" panose="020F0502020204030204" pitchFamily="34" charset="0"/>
+                <a:cs typeface="Times New Roman" panose="02020603050405020304" pitchFamily="18" charset="0"/>
+              </a:rPr>
+              <a:t>Today we are consuming data from PCA. We have implemented a SPARQL web-client, that fetch data from PCA. In this first stage we are linking attribute definitions, unit of measurement, Quantities, Range or Quantity datums and Range datums.</a:t>
+            </a:r>
           </a:p>
           <a:p>
             <a:pPr>
@@ -896,17 +962,27 @@
                 <a:ea typeface="Calibri" panose="020F0502020204030204" pitchFamily="34" charset="0"/>
                 <a:cs typeface="Times New Roman" panose="02020603050405020304" pitchFamily="18" charset="0"/>
               </a:rPr>
-              <a:t>In the future we wish to consume as much data as possible. We want to minimize the number of sources. Of experience it does not scale very well.</a:t>
-            </a:r>
-            <a:r>
-              <a:rPr lang="nb-NO" sz="1800" dirty="0">
-                <a:effectLst/>
-                <a:latin typeface="Calibri" panose="020F0502020204030204" pitchFamily="34" charset="0"/>
-                <a:ea typeface="Calibri" panose="020F0502020204030204" pitchFamily="34" charset="0"/>
-                <a:cs typeface="Times New Roman" panose="02020603050405020304" pitchFamily="18" charset="0"/>
-              </a:rPr>
-              <a:t> </a:t>
-            </a:r>
+              <a:t>Tyle will run as a separate instance and serve all Mimir applications. This because we want to reuse types across the industry.</a:t>
+            </a:r>
+          </a:p>
+          <a:p>
+            <a:pPr marL="0" marR="0" lvl="0" indent="0" algn="l" defTabSz="914400" rtl="0" eaLnBrk="1" fontAlgn="auto" latinLnBrk="0" hangingPunct="1">
+              <a:lnSpc>
+                <a:spcPct val="107000"/>
+              </a:lnSpc>
+              <a:spcBef>
+                <a:spcPts val="0"/>
+              </a:spcBef>
+              <a:spcAft>
+                <a:spcPts val="800"/>
+              </a:spcAft>
+              <a:buClrTx/>
+              <a:buSzTx/>
+              <a:buFontTx/>
+              <a:buNone/>
+              <a:tabLst/>
+              <a:defRPr/>
+            </a:pPr>
             <a:r>
               <a:rPr lang="en-US" sz="1800" dirty="0">
                 <a:effectLst/>
@@ -914,7 +990,7 @@
                 <a:ea typeface="Calibri" panose="020F0502020204030204" pitchFamily="34" charset="0"/>
                 <a:cs typeface="Times New Roman" panose="02020603050405020304" pitchFamily="18" charset="0"/>
               </a:rPr>
-              <a:t>I think Magnus and others in the team will talk more about the roadmap afterwards.</a:t>
+              <a:t>Think about Tyle as a template editor, and not a type-editor. Some of these templates could also possibly become types or IMF types.  </a:t>
             </a:r>
             <a:endParaRPr lang="nb-NO" sz="1800" dirty="0">
               <a:effectLst/>
@@ -955,25 +1031,7 @@
                 <a:ea typeface="Calibri" panose="020F0502020204030204" pitchFamily="34" charset="0"/>
                 <a:cs typeface="Times New Roman" panose="02020603050405020304" pitchFamily="18" charset="0"/>
               </a:rPr>
-              <a:t>Tyle and Mimir has a React client and a </a:t>
-            </a:r>
-            <a:r>
-              <a:rPr lang="en-US" sz="1800" dirty="0" err="1">
-                <a:effectLst/>
-                <a:latin typeface="Calibri" panose="020F0502020204030204" pitchFamily="34" charset="0"/>
-                <a:ea typeface="Calibri" panose="020F0502020204030204" pitchFamily="34" charset="0"/>
-                <a:cs typeface="Times New Roman" panose="02020603050405020304" pitchFamily="18" charset="0"/>
-              </a:rPr>
-              <a:t>.Net</a:t>
-            </a:r>
-            <a:r>
-              <a:rPr lang="en-US" sz="1800" dirty="0">
-                <a:effectLst/>
-                <a:latin typeface="Calibri" panose="020F0502020204030204" pitchFamily="34" charset="0"/>
-                <a:ea typeface="Calibri" panose="020F0502020204030204" pitchFamily="34" charset="0"/>
-                <a:cs typeface="Times New Roman" panose="02020603050405020304" pitchFamily="18" charset="0"/>
-              </a:rPr>
-              <a:t> backend application. You can find more information about the technology stack at the GitHub repository. Each application has a SQL backup store.</a:t>
+              <a:t>Mimir is the application that using the types to do facility work.</a:t>
             </a:r>
             <a:endParaRPr lang="nb-NO" sz="1800" dirty="0">
               <a:effectLst/>
@@ -981,189 +1039,6 @@
               <a:ea typeface="Calibri" panose="020F0502020204030204" pitchFamily="34" charset="0"/>
               <a:cs typeface="Times New Roman" panose="02020603050405020304" pitchFamily="18" charset="0"/>
             </a:endParaRPr>
-          </a:p>
-          <a:p>
-            <a:pPr>
-              <a:lnSpc>
-                <a:spcPct val="107000"/>
-              </a:lnSpc>
-              <a:spcAft>
-                <a:spcPts val="800"/>
-              </a:spcAft>
-            </a:pPr>
-            <a:endParaRPr lang="en-US" sz="1800" dirty="0">
-              <a:effectLst/>
-              <a:latin typeface="Calibri" panose="020F0502020204030204" pitchFamily="34" charset="0"/>
-              <a:ea typeface="Calibri" panose="020F0502020204030204" pitchFamily="34" charset="0"/>
-              <a:cs typeface="Times New Roman" panose="02020603050405020304" pitchFamily="18" charset="0"/>
-            </a:endParaRPr>
-          </a:p>
-          <a:p>
-            <a:pPr>
-              <a:lnSpc>
-                <a:spcPct val="107000"/>
-              </a:lnSpc>
-              <a:spcAft>
-                <a:spcPts val="800"/>
-              </a:spcAft>
-            </a:pPr>
-            <a:r>
-              <a:rPr lang="en-US" sz="1800" dirty="0">
-                <a:effectLst/>
-                <a:latin typeface="Calibri" panose="020F0502020204030204" pitchFamily="34" charset="0"/>
-                <a:ea typeface="Calibri" panose="020F0502020204030204" pitchFamily="34" charset="0"/>
-                <a:cs typeface="Times New Roman" panose="02020603050405020304" pitchFamily="18" charset="0"/>
-              </a:rPr>
-              <a:t>Some of you have already seen Mimir. Mimir is the application that using the types to do facility work. You will have a short demo on this after I am finished talking.</a:t>
-            </a:r>
-            <a:endParaRPr lang="nb-NO" sz="1800" dirty="0">
-              <a:effectLst/>
-              <a:latin typeface="Calibri" panose="020F0502020204030204" pitchFamily="34" charset="0"/>
-              <a:ea typeface="Calibri" panose="020F0502020204030204" pitchFamily="34" charset="0"/>
-              <a:cs typeface="Times New Roman" panose="02020603050405020304" pitchFamily="18" charset="0"/>
-            </a:endParaRPr>
-          </a:p>
-          <a:p>
-            <a:pPr>
-              <a:lnSpc>
-                <a:spcPct val="107000"/>
-              </a:lnSpc>
-              <a:spcAft>
-                <a:spcPts val="800"/>
-              </a:spcAft>
-            </a:pPr>
-            <a:endParaRPr lang="en-US" sz="1800" dirty="0">
-              <a:effectLst/>
-              <a:latin typeface="Calibri" panose="020F0502020204030204" pitchFamily="34" charset="0"/>
-              <a:ea typeface="Calibri" panose="020F0502020204030204" pitchFamily="34" charset="0"/>
-              <a:cs typeface="Times New Roman" panose="02020603050405020304" pitchFamily="18" charset="0"/>
-            </a:endParaRPr>
-          </a:p>
-          <a:p>
-            <a:pPr>
-              <a:lnSpc>
-                <a:spcPct val="107000"/>
-              </a:lnSpc>
-              <a:spcAft>
-                <a:spcPts val="800"/>
-              </a:spcAft>
-            </a:pPr>
-            <a:r>
-              <a:rPr lang="en-US" sz="1800" dirty="0">
-                <a:effectLst/>
-                <a:latin typeface="Calibri" panose="020F0502020204030204" pitchFamily="34" charset="0"/>
-                <a:ea typeface="Calibri" panose="020F0502020204030204" pitchFamily="34" charset="0"/>
-                <a:cs typeface="Times New Roman" panose="02020603050405020304" pitchFamily="18" charset="0"/>
-              </a:rPr>
-              <a:t>Tyle will run as a separate instance and serve all Mimir applications. That because we want to reuse types across the industry. It will generate less work for everybody, and maybe the most important thing is to reduce the risk of failure. </a:t>
-            </a:r>
-          </a:p>
-          <a:p>
-            <a:pPr>
-              <a:lnSpc>
-                <a:spcPct val="107000"/>
-              </a:lnSpc>
-              <a:spcAft>
-                <a:spcPts val="800"/>
-              </a:spcAft>
-            </a:pPr>
-            <a:r>
-              <a:rPr lang="en-US" sz="1800" dirty="0">
-                <a:effectLst/>
-                <a:latin typeface="Calibri" panose="020F0502020204030204" pitchFamily="34" charset="0"/>
-                <a:ea typeface="Calibri" panose="020F0502020204030204" pitchFamily="34" charset="0"/>
-                <a:cs typeface="Times New Roman" panose="02020603050405020304" pitchFamily="18" charset="0"/>
-              </a:rPr>
-              <a:t>Increased synchronization of data between applications increases the probability of errors.</a:t>
-            </a:r>
-          </a:p>
-          <a:p>
-            <a:pPr>
-              <a:lnSpc>
-                <a:spcPct val="107000"/>
-              </a:lnSpc>
-              <a:spcAft>
-                <a:spcPts val="800"/>
-              </a:spcAft>
-            </a:pPr>
-            <a:endParaRPr lang="nb-NO" sz="1800" dirty="0">
-              <a:effectLst/>
-              <a:latin typeface="Calibri" panose="020F0502020204030204" pitchFamily="34" charset="0"/>
-              <a:ea typeface="Calibri" panose="020F0502020204030204" pitchFamily="34" charset="0"/>
-              <a:cs typeface="Times New Roman" panose="02020603050405020304" pitchFamily="18" charset="0"/>
-            </a:endParaRPr>
-          </a:p>
-          <a:p>
-            <a:pPr>
-              <a:lnSpc>
-                <a:spcPct val="107000"/>
-              </a:lnSpc>
-              <a:spcAft>
-                <a:spcPts val="800"/>
-              </a:spcAft>
-            </a:pPr>
-            <a:r>
-              <a:rPr lang="en-US" sz="1800" dirty="0">
-                <a:effectLst/>
-                <a:latin typeface="Calibri" panose="020F0502020204030204" pitchFamily="34" charset="0"/>
-                <a:ea typeface="Calibri" panose="020F0502020204030204" pitchFamily="34" charset="0"/>
-                <a:cs typeface="Times New Roman" panose="02020603050405020304" pitchFamily="18" charset="0"/>
-              </a:rPr>
-              <a:t>Common questions we get is, why do we need Tyle in between? It is hard to create a good user-friendly application with only types from different ontologies. We want to create as much reusable data as we can, to reduce the workload for all the Mimir users.</a:t>
-            </a:r>
-            <a:endParaRPr lang="nb-NO" sz="1800" dirty="0">
-              <a:effectLst/>
-              <a:latin typeface="Calibri" panose="020F0502020204030204" pitchFamily="34" charset="0"/>
-              <a:ea typeface="Calibri" panose="020F0502020204030204" pitchFamily="34" charset="0"/>
-              <a:cs typeface="Times New Roman" panose="02020603050405020304" pitchFamily="18" charset="0"/>
-            </a:endParaRPr>
-          </a:p>
-          <a:p>
-            <a:pPr>
-              <a:lnSpc>
-                <a:spcPct val="107000"/>
-              </a:lnSpc>
-              <a:spcAft>
-                <a:spcPts val="800"/>
-              </a:spcAft>
-            </a:pPr>
-            <a:r>
-              <a:rPr lang="en-US" sz="1800" dirty="0">
-                <a:effectLst/>
-                <a:latin typeface="Calibri" panose="020F0502020204030204" pitchFamily="34" charset="0"/>
-                <a:ea typeface="Calibri" panose="020F0502020204030204" pitchFamily="34" charset="0"/>
-                <a:cs typeface="Times New Roman" panose="02020603050405020304" pitchFamily="18" charset="0"/>
-              </a:rPr>
-              <a:t>Another important reason, is that there is no system that contains all the data we need. </a:t>
-            </a:r>
-          </a:p>
-          <a:p>
-            <a:pPr>
-              <a:lnSpc>
-                <a:spcPct val="107000"/>
-              </a:lnSpc>
-              <a:spcAft>
-                <a:spcPts val="800"/>
-              </a:spcAft>
-            </a:pPr>
-            <a:r>
-              <a:rPr lang="en-US" sz="1800" dirty="0">
-                <a:effectLst/>
-                <a:latin typeface="Calibri" panose="020F0502020204030204" pitchFamily="34" charset="0"/>
-                <a:ea typeface="Calibri" panose="020F0502020204030204" pitchFamily="34" charset="0"/>
-                <a:cs typeface="Times New Roman" panose="02020603050405020304" pitchFamily="18" charset="0"/>
-              </a:rPr>
-              <a:t>Think about Tyle as a template editor, and not a type-editor. Some of these templates could also possibly become types or IMF types.  </a:t>
-            </a:r>
-            <a:endParaRPr lang="nb-NO" sz="1800" dirty="0">
-              <a:effectLst/>
-              <a:latin typeface="Calibri" panose="020F0502020204030204" pitchFamily="34" charset="0"/>
-              <a:ea typeface="Calibri" panose="020F0502020204030204" pitchFamily="34" charset="0"/>
-              <a:cs typeface="Times New Roman" panose="02020603050405020304" pitchFamily="18" charset="0"/>
-            </a:endParaRPr>
-          </a:p>
-          <a:p>
-            <a:endParaRPr lang="nb-NO" dirty="0"/>
           </a:p>
         </p:txBody>
       </p:sp>
@@ -1274,22 +1149,6 @@
                 <a:spcPts val="800"/>
               </a:spcAft>
             </a:pPr>
-            <a:endParaRPr lang="en-US" sz="1800" dirty="0">
-              <a:effectLst/>
-              <a:latin typeface="Calibri" panose="020F0502020204030204" pitchFamily="34" charset="0"/>
-              <a:ea typeface="Calibri" panose="020F0502020204030204" pitchFamily="34" charset="0"/>
-              <a:cs typeface="Times New Roman" panose="02020603050405020304" pitchFamily="18" charset="0"/>
-            </a:endParaRPr>
-          </a:p>
-          <a:p>
-            <a:pPr>
-              <a:lnSpc>
-                <a:spcPct val="107000"/>
-              </a:lnSpc>
-              <a:spcAft>
-                <a:spcPts val="800"/>
-              </a:spcAft>
-            </a:pPr>
             <a:r>
               <a:rPr lang="en-US" sz="1800" dirty="0">
                 <a:effectLst/>
@@ -1299,50 +1158,6 @@
               </a:rPr>
               <a:t>Also in the future, we wish to include Equinor’s Common Library as an internal source for data. Our code is structured in a way that makes it possible to include other sources. </a:t>
             </a:r>
-          </a:p>
-          <a:p>
-            <a:pPr>
-              <a:lnSpc>
-                <a:spcPct val="107000"/>
-              </a:lnSpc>
-              <a:spcAft>
-                <a:spcPts val="800"/>
-              </a:spcAft>
-            </a:pPr>
-            <a:r>
-              <a:rPr lang="en-US" sz="1800" dirty="0">
-                <a:effectLst/>
-                <a:latin typeface="Calibri" panose="020F0502020204030204" pitchFamily="34" charset="0"/>
-                <a:ea typeface="Calibri" panose="020F0502020204030204" pitchFamily="34" charset="0"/>
-                <a:cs typeface="Times New Roman" panose="02020603050405020304" pitchFamily="18" charset="0"/>
-              </a:rPr>
-              <a:t>At the present time we are not sure what area of responsibility Common Library will have, but I think it will have a central position in sharing IMF data. </a:t>
-            </a:r>
-          </a:p>
-          <a:p>
-            <a:pPr>
-              <a:lnSpc>
-                <a:spcPct val="107000"/>
-              </a:lnSpc>
-              <a:spcAft>
-                <a:spcPts val="800"/>
-              </a:spcAft>
-            </a:pPr>
-            <a:r>
-              <a:rPr lang="en-US" sz="1800" dirty="0">
-                <a:effectLst/>
-                <a:latin typeface="Calibri" panose="020F0502020204030204" pitchFamily="34" charset="0"/>
-                <a:ea typeface="Calibri" panose="020F0502020204030204" pitchFamily="34" charset="0"/>
-                <a:cs typeface="Times New Roman" panose="02020603050405020304" pitchFamily="18" charset="0"/>
-              </a:rPr>
-              <a:t>It is important for us at this step, to not make an architecture that exclude other sources in the future.</a:t>
-            </a:r>
-            <a:endParaRPr lang="nb-NO" sz="1800" dirty="0">
-              <a:effectLst/>
-              <a:latin typeface="Calibri" panose="020F0502020204030204" pitchFamily="34" charset="0"/>
-              <a:ea typeface="Calibri" panose="020F0502020204030204" pitchFamily="34" charset="0"/>
-              <a:cs typeface="Times New Roman" panose="02020603050405020304" pitchFamily="18" charset="0"/>
-            </a:endParaRPr>
           </a:p>
           <a:p>
             <a:pPr>
@@ -1376,7 +1191,26 @@
                 <a:ea typeface="Calibri" panose="020F0502020204030204" pitchFamily="34" charset="0"/>
                 <a:cs typeface="Times New Roman" panose="02020603050405020304" pitchFamily="18" charset="0"/>
               </a:rPr>
-              <a:t>Olav will now give us a demo of Tyle.</a:t>
+              <a:t>At the present time we are not sure what area of responsibility Common Library will have, but I think it will have a central position in sharing IMF data. </a:t>
+            </a:r>
+          </a:p>
+          <a:p>
+            <a:pPr>
+              <a:lnSpc>
+                <a:spcPct val="107000"/>
+              </a:lnSpc>
+              <a:spcAft>
+                <a:spcPts val="800"/>
+              </a:spcAft>
+            </a:pPr>
+            <a:r>
+              <a:rPr lang="en-US" sz="1800" dirty="0">
+                <a:effectLst/>
+                <a:latin typeface="Calibri" panose="020F0502020204030204" pitchFamily="34" charset="0"/>
+                <a:ea typeface="Calibri" panose="020F0502020204030204" pitchFamily="34" charset="0"/>
+                <a:cs typeface="Times New Roman" panose="02020603050405020304" pitchFamily="18" charset="0"/>
+              </a:rPr>
+              <a:t>It is important for us at this step, to not make an architecture that exclude other sources in the future.</a:t>
             </a:r>
             <a:endParaRPr lang="nb-NO" sz="1800" dirty="0">
               <a:effectLst/>
@@ -1386,7 +1220,20 @@
             </a:endParaRPr>
           </a:p>
           <a:p>
-            <a:endParaRPr lang="nb-NO" dirty="0"/>
+            <a:pPr>
+              <a:lnSpc>
+                <a:spcPct val="107000"/>
+              </a:lnSpc>
+              <a:spcAft>
+                <a:spcPts val="800"/>
+              </a:spcAft>
+            </a:pPr>
+            <a:endParaRPr lang="en-US" sz="1800" dirty="0">
+              <a:effectLst/>
+              <a:latin typeface="Calibri" panose="020F0502020204030204" pitchFamily="34" charset="0"/>
+              <a:ea typeface="Calibri" panose="020F0502020204030204" pitchFamily="34" charset="0"/>
+              <a:cs typeface="Times New Roman" panose="02020603050405020304" pitchFamily="18" charset="0"/>
+            </a:endParaRPr>
           </a:p>
         </p:txBody>
       </p:sp>
@@ -1575,7 +1422,7 @@
           <a:p>
             <a:fld id="{6B0483F0-762C-4700-A30B-8879A7D9DA24}" type="datetimeFigureOut">
               <a:rPr lang="nb-NO" smtClean="0"/>
-              <a:t>07.09.2022</a:t>
+              <a:t>08.09.2022</a:t>
             </a:fld>
             <a:endParaRPr lang="nb-NO"/>
           </a:p>
@@ -1775,7 +1622,7 @@
           <a:p>
             <a:fld id="{6B0483F0-762C-4700-A30B-8879A7D9DA24}" type="datetimeFigureOut">
               <a:rPr lang="nb-NO" smtClean="0"/>
-              <a:t>07.09.2022</a:t>
+              <a:t>08.09.2022</a:t>
             </a:fld>
             <a:endParaRPr lang="nb-NO"/>
           </a:p>
@@ -1985,7 +1832,7 @@
           <a:p>
             <a:fld id="{6B0483F0-762C-4700-A30B-8879A7D9DA24}" type="datetimeFigureOut">
               <a:rPr lang="nb-NO" smtClean="0"/>
-              <a:t>07.09.2022</a:t>
+              <a:t>08.09.2022</a:t>
             </a:fld>
             <a:endParaRPr lang="nb-NO"/>
           </a:p>
@@ -2185,7 +2032,7 @@
           <a:p>
             <a:fld id="{6B0483F0-762C-4700-A30B-8879A7D9DA24}" type="datetimeFigureOut">
               <a:rPr lang="nb-NO" smtClean="0"/>
-              <a:t>07.09.2022</a:t>
+              <a:t>08.09.2022</a:t>
             </a:fld>
             <a:endParaRPr lang="nb-NO"/>
           </a:p>
@@ -2461,7 +2308,7 @@
           <a:p>
             <a:fld id="{6B0483F0-762C-4700-A30B-8879A7D9DA24}" type="datetimeFigureOut">
               <a:rPr lang="nb-NO" smtClean="0"/>
-              <a:t>07.09.2022</a:t>
+              <a:t>08.09.2022</a:t>
             </a:fld>
             <a:endParaRPr lang="nb-NO"/>
           </a:p>
@@ -2729,7 +2576,7 @@
           <a:p>
             <a:fld id="{6B0483F0-762C-4700-A30B-8879A7D9DA24}" type="datetimeFigureOut">
               <a:rPr lang="nb-NO" smtClean="0"/>
-              <a:t>07.09.2022</a:t>
+              <a:t>08.09.2022</a:t>
             </a:fld>
             <a:endParaRPr lang="nb-NO"/>
           </a:p>
@@ -3144,7 +2991,7 @@
           <a:p>
             <a:fld id="{6B0483F0-762C-4700-A30B-8879A7D9DA24}" type="datetimeFigureOut">
               <a:rPr lang="nb-NO" smtClean="0"/>
-              <a:t>07.09.2022</a:t>
+              <a:t>08.09.2022</a:t>
             </a:fld>
             <a:endParaRPr lang="nb-NO"/>
           </a:p>
@@ -3286,7 +3133,7 @@
           <a:p>
             <a:fld id="{6B0483F0-762C-4700-A30B-8879A7D9DA24}" type="datetimeFigureOut">
               <a:rPr lang="nb-NO" smtClean="0"/>
-              <a:t>07.09.2022</a:t>
+              <a:t>08.09.2022</a:t>
             </a:fld>
             <a:endParaRPr lang="nb-NO"/>
           </a:p>
@@ -3399,7 +3246,7 @@
           <a:p>
             <a:fld id="{6B0483F0-762C-4700-A30B-8879A7D9DA24}" type="datetimeFigureOut">
               <a:rPr lang="nb-NO" smtClean="0"/>
-              <a:t>07.09.2022</a:t>
+              <a:t>08.09.2022</a:t>
             </a:fld>
             <a:endParaRPr lang="nb-NO"/>
           </a:p>
@@ -3712,7 +3559,7 @@
           <a:p>
             <a:fld id="{6B0483F0-762C-4700-A30B-8879A7D9DA24}" type="datetimeFigureOut">
               <a:rPr lang="nb-NO" smtClean="0"/>
-              <a:t>07.09.2022</a:t>
+              <a:t>08.09.2022</a:t>
             </a:fld>
             <a:endParaRPr lang="nb-NO"/>
           </a:p>
@@ -4001,7 +3848,7 @@
           <a:p>
             <a:fld id="{6B0483F0-762C-4700-A30B-8879A7D9DA24}" type="datetimeFigureOut">
               <a:rPr lang="nb-NO" smtClean="0"/>
-              <a:t>07.09.2022</a:t>
+              <a:t>08.09.2022</a:t>
             </a:fld>
             <a:endParaRPr lang="nb-NO"/>
           </a:p>
@@ -4244,7 +4091,7 @@
           <a:p>
             <a:fld id="{6B0483F0-762C-4700-A30B-8879A7D9DA24}" type="datetimeFigureOut">
               <a:rPr lang="nb-NO" smtClean="0"/>
-              <a:t>07.09.2022</a:t>
+              <a:t>08.09.2022</a:t>
             </a:fld>
             <a:endParaRPr lang="nb-NO"/>
           </a:p>

</xml_diff>